<commit_message>
Minor modifications to the slides
</commit_message>
<xml_diff>
--- a/deep-learning-in-practice-with-pytorch/1-intermediate-pytorch.pptx
+++ b/deep-learning-in-practice-with-pytorch/1-intermediate-pytorch.pptx
@@ -4287,7 +4287,7 @@
           <a:p>
             <a:r>
               <a:rPr lang="en-US" dirty="0"/>
-              <a:t>Checkpoints are the starting point of </a:t>
+              <a:t>Checkpoints are one of the foundations of </a:t>
             </a:r>
             <a:r>
               <a:rPr lang="en-US" b="1" dirty="0"/>
@@ -5106,7 +5106,7 @@
         </p:blipFill>
         <p:spPr bwMode="auto">
           <a:xfrm>
-            <a:off x="6700444" y="3061649"/>
+            <a:off x="6700444" y="3174773"/>
             <a:ext cx="4653356" cy="2924967"/>
           </a:xfrm>
           <a:prstGeom prst="rect">
@@ -5124,6 +5124,57 @@
           </a:extLst>
         </p:spPr>
       </p:pic>
+      <p:sp>
+        <p:nvSpPr>
+          <p:cNvPr id="4" name="ZoneTexte 3">
+            <a:extLst>
+              <a:ext uri="{FF2B5EF4-FFF2-40B4-BE49-F238E27FC236}">
+                <a16:creationId xmlns:a16="http://schemas.microsoft.com/office/drawing/2014/main" id="{6E92DB3B-FC21-45E0-81E1-E3D6808B2A71}"/>
+              </a:ext>
+            </a:extLst>
+          </p:cNvPr>
+          <p:cNvSpPr txBox="1"/>
+          <p:nvPr/>
+        </p:nvSpPr>
+        <p:spPr>
+          <a:xfrm>
+            <a:off x="4192914" y="4047078"/>
+            <a:ext cx="2507530" cy="954107"/>
+          </a:xfrm>
+          <a:prstGeom prst="rect">
+            <a:avLst/>
+          </a:prstGeom>
+          <a:noFill/>
+        </p:spPr>
+        <p:txBody>
+          <a:bodyPr wrap="square" rtlCol="0">
+            <a:spAutoFit/>
+          </a:bodyPr>
+          <a:lstStyle/>
+          <a:p>
+            <a:pPr algn="r"/>
+            <a:r>
+              <a:rPr lang="en-US" sz="2800" b="1" dirty="0">
+                <a:solidFill>
+                  <a:schemeClr val="accent1"/>
+                </a:solidFill>
+              </a:rPr>
+              <a:t>Training loss</a:t>
+            </a:r>
+          </a:p>
+          <a:p>
+            <a:pPr algn="r"/>
+            <a:r>
+              <a:rPr lang="en-US" sz="2800" b="1" dirty="0">
+                <a:solidFill>
+                  <a:schemeClr val="accent2"/>
+                </a:solidFill>
+              </a:rPr>
+              <a:t>Validation loss</a:t>
+            </a:r>
+          </a:p>
+        </p:txBody>
+      </p:sp>
     </p:spTree>
     <p:extLst>
       <p:ext uri="{BB962C8B-B14F-4D97-AF65-F5344CB8AC3E}">

</xml_diff>